<commit_message>
One! module added to the powerpoint scheme...
</commit_message>
<xml_diff>
--- a/docs/Summary.pptx
+++ b/docs/Summary.pptx
@@ -289,7 +289,7 @@
           <a:p>
             <a:fld id="{7A847CFC-816F-41D0-AAC0-9BF4FEBC753E}" type="datetimeFigureOut">
               <a:rPr lang="es-ES" smtClean="0"/>
-              <a:t>16/02/2022</a:t>
+              <a:t>01/03/2022</a:t>
             </a:fld>
             <a:endParaRPr lang="es-ES"/>
           </a:p>
@@ -454,7 +454,7 @@
           <a:p>
             <a:fld id="{7A847CFC-816F-41D0-AAC0-9BF4FEBC753E}" type="datetimeFigureOut">
               <a:rPr lang="es-ES" smtClean="0"/>
-              <a:t>16/02/2022</a:t>
+              <a:t>01/03/2022</a:t>
             </a:fld>
             <a:endParaRPr lang="es-ES"/>
           </a:p>
@@ -629,7 +629,7 @@
           <a:p>
             <a:fld id="{7A847CFC-816F-41D0-AAC0-9BF4FEBC753E}" type="datetimeFigureOut">
               <a:rPr lang="es-ES" smtClean="0"/>
-              <a:t>16/02/2022</a:t>
+              <a:t>01/03/2022</a:t>
             </a:fld>
             <a:endParaRPr lang="es-ES"/>
           </a:p>
@@ -794,7 +794,7 @@
           <a:p>
             <a:fld id="{7A847CFC-816F-41D0-AAC0-9BF4FEBC753E}" type="datetimeFigureOut">
               <a:rPr lang="es-ES" smtClean="0"/>
-              <a:t>16/02/2022</a:t>
+              <a:t>01/03/2022</a:t>
             </a:fld>
             <a:endParaRPr lang="es-ES"/>
           </a:p>
@@ -1035,7 +1035,7 @@
           <a:p>
             <a:fld id="{7A847CFC-816F-41D0-AAC0-9BF4FEBC753E}" type="datetimeFigureOut">
               <a:rPr lang="es-ES" smtClean="0"/>
-              <a:t>16/02/2022</a:t>
+              <a:t>01/03/2022</a:t>
             </a:fld>
             <a:endParaRPr lang="es-ES"/>
           </a:p>
@@ -1318,7 +1318,7 @@
           <a:p>
             <a:fld id="{7A847CFC-816F-41D0-AAC0-9BF4FEBC753E}" type="datetimeFigureOut">
               <a:rPr lang="es-ES" smtClean="0"/>
-              <a:t>16/02/2022</a:t>
+              <a:t>01/03/2022</a:t>
             </a:fld>
             <a:endParaRPr lang="es-ES"/>
           </a:p>
@@ -1735,7 +1735,7 @@
           <a:p>
             <a:fld id="{7A847CFC-816F-41D0-AAC0-9BF4FEBC753E}" type="datetimeFigureOut">
               <a:rPr lang="es-ES" smtClean="0"/>
-              <a:t>16/02/2022</a:t>
+              <a:t>01/03/2022</a:t>
             </a:fld>
             <a:endParaRPr lang="es-ES"/>
           </a:p>
@@ -1848,7 +1848,7 @@
           <a:p>
             <a:fld id="{7A847CFC-816F-41D0-AAC0-9BF4FEBC753E}" type="datetimeFigureOut">
               <a:rPr lang="es-ES" smtClean="0"/>
-              <a:t>16/02/2022</a:t>
+              <a:t>01/03/2022</a:t>
             </a:fld>
             <a:endParaRPr lang="es-ES"/>
           </a:p>
@@ -1938,7 +1938,7 @@
           <a:p>
             <a:fld id="{7A847CFC-816F-41D0-AAC0-9BF4FEBC753E}" type="datetimeFigureOut">
               <a:rPr lang="es-ES" smtClean="0"/>
-              <a:t>16/02/2022</a:t>
+              <a:t>01/03/2022</a:t>
             </a:fld>
             <a:endParaRPr lang="es-ES"/>
           </a:p>
@@ -2210,7 +2210,7 @@
           <a:p>
             <a:fld id="{7A847CFC-816F-41D0-AAC0-9BF4FEBC753E}" type="datetimeFigureOut">
               <a:rPr lang="es-ES" smtClean="0"/>
-              <a:t>16/02/2022</a:t>
+              <a:t>01/03/2022</a:t>
             </a:fld>
             <a:endParaRPr lang="es-ES"/>
           </a:p>
@@ -2458,7 +2458,7 @@
           <a:p>
             <a:fld id="{7A847CFC-816F-41D0-AAC0-9BF4FEBC753E}" type="datetimeFigureOut">
               <a:rPr lang="es-ES" smtClean="0"/>
-              <a:t>16/02/2022</a:t>
+              <a:t>01/03/2022</a:t>
             </a:fld>
             <a:endParaRPr lang="es-ES"/>
           </a:p>
@@ -2666,7 +2666,7 @@
           <a:p>
             <a:fld id="{7A847CFC-816F-41D0-AAC0-9BF4FEBC753E}" type="datetimeFigureOut">
               <a:rPr lang="es-ES" smtClean="0"/>
-              <a:t>16/02/2022</a:t>
+              <a:t>01/03/2022</a:t>
             </a:fld>
             <a:endParaRPr lang="es-ES"/>
           </a:p>
@@ -5620,231 +5620,6 @@
           </a:fontRef>
         </p:style>
       </p:cxnSp>
-      <p:grpSp>
-        <p:nvGrpSpPr>
-          <p:cNvPr id="28" name="27 Grupo"/>
-          <p:cNvGrpSpPr/>
-          <p:nvPr/>
-        </p:nvGrpSpPr>
-        <p:grpSpPr>
-          <a:xfrm>
-            <a:off x="1937296" y="5083716"/>
-            <a:ext cx="2283048" cy="1774284"/>
-            <a:chOff x="2051175" y="1166811"/>
-            <a:chExt cx="1757677" cy="1398521"/>
-          </a:xfrm>
-        </p:grpSpPr>
-        <p:sp>
-          <p:nvSpPr>
-            <p:cNvPr id="29" name="28 Rectángulo"/>
-            <p:cNvSpPr/>
-            <p:nvPr/>
-          </p:nvSpPr>
-          <p:spPr>
-            <a:xfrm>
-              <a:off x="2051175" y="1166811"/>
-              <a:ext cx="1756361" cy="198006"/>
-            </a:xfrm>
-            <a:prstGeom prst="rect">
-              <a:avLst/>
-            </a:prstGeom>
-            <a:noFill/>
-          </p:spPr>
-          <p:style>
-            <a:lnRef idx="2">
-              <a:schemeClr val="accent1">
-                <a:shade val="50000"/>
-              </a:schemeClr>
-            </a:lnRef>
-            <a:fillRef idx="1">
-              <a:schemeClr val="accent1"/>
-            </a:fillRef>
-            <a:effectRef idx="0">
-              <a:schemeClr val="accent1"/>
-            </a:effectRef>
-            <a:fontRef idx="minor">
-              <a:schemeClr val="lt1"/>
-            </a:fontRef>
-          </p:style>
-          <p:txBody>
-            <a:bodyPr lIns="0" tIns="0" rIns="0" bIns="0" rtlCol="0" anchor="ctr"/>
-            <a:lstStyle/>
-            <a:p>
-              <a:pPr algn="ctr"/>
-              <a:endParaRPr lang="es-ES" sz="1200"/>
-            </a:p>
-          </p:txBody>
-        </p:sp>
-        <p:sp>
-          <p:nvSpPr>
-            <p:cNvPr id="30" name="29 Rectángulo"/>
-            <p:cNvSpPr/>
-            <p:nvPr/>
-          </p:nvSpPr>
-          <p:spPr>
-            <a:xfrm>
-              <a:off x="2052491" y="1362992"/>
-              <a:ext cx="1756361" cy="1202340"/>
-            </a:xfrm>
-            <a:prstGeom prst="rect">
-              <a:avLst/>
-            </a:prstGeom>
-            <a:noFill/>
-          </p:spPr>
-          <p:style>
-            <a:lnRef idx="2">
-              <a:schemeClr val="accent1">
-                <a:shade val="50000"/>
-              </a:schemeClr>
-            </a:lnRef>
-            <a:fillRef idx="1">
-              <a:schemeClr val="accent1"/>
-            </a:fillRef>
-            <a:effectRef idx="0">
-              <a:schemeClr val="accent1"/>
-            </a:effectRef>
-            <a:fontRef idx="minor">
-              <a:schemeClr val="lt1"/>
-            </a:fontRef>
-          </p:style>
-          <p:txBody>
-            <a:bodyPr lIns="0" tIns="0" rIns="0" bIns="0" rtlCol="0" anchor="ctr"/>
-            <a:lstStyle/>
-            <a:p>
-              <a:pPr algn="ctr"/>
-              <a:endParaRPr lang="es-ES" sz="1200"/>
-            </a:p>
-          </p:txBody>
-        </p:sp>
-      </p:grpSp>
-      <p:sp>
-        <p:nvSpPr>
-          <p:cNvPr id="31" name="30 Rectángulo"/>
-          <p:cNvSpPr/>
-          <p:nvPr/>
-        </p:nvSpPr>
-        <p:spPr>
-          <a:xfrm>
-            <a:off x="2460319" y="5086562"/>
-            <a:ext cx="1107931" cy="184666"/>
-          </a:xfrm>
-          <a:prstGeom prst="rect">
-            <a:avLst/>
-          </a:prstGeom>
-        </p:spPr>
-        <p:txBody>
-          <a:bodyPr wrap="none" lIns="0" tIns="0" rIns="0" bIns="0">
-            <a:spAutoFit/>
-          </a:bodyPr>
-          <a:lstStyle/>
-          <a:p>
-            <a:pPr lvl="0" algn="ctr"/>
-            <a:r>
-              <a:rPr lang="es-ES" sz="1200" b="1" dirty="0" err="1" smtClean="0">
-                <a:solidFill>
-                  <a:prstClr val="black"/>
-                </a:solidFill>
-              </a:rPr>
-              <a:t>sqlite_request.py</a:t>
-            </a:r>
-            <a:endParaRPr lang="en-US" sz="1100" b="1" dirty="0">
-              <a:solidFill>
-                <a:prstClr val="black"/>
-              </a:solidFill>
-            </a:endParaRPr>
-          </a:p>
-        </p:txBody>
-      </p:sp>
-      <p:sp>
-        <p:nvSpPr>
-          <p:cNvPr id="32" name="31 Rectángulo"/>
-          <p:cNvSpPr/>
-          <p:nvPr/>
-        </p:nvSpPr>
-        <p:spPr>
-          <a:xfrm>
-            <a:off x="2123975" y="5601957"/>
-            <a:ext cx="1931618" cy="169277"/>
-          </a:xfrm>
-          <a:prstGeom prst="rect">
-            <a:avLst/>
-          </a:prstGeom>
-        </p:spPr>
-        <p:txBody>
-          <a:bodyPr wrap="none" lIns="0" tIns="0" rIns="0" bIns="0">
-            <a:spAutoFit/>
-          </a:bodyPr>
-          <a:lstStyle/>
-          <a:p>
-            <a:pPr algn="ctr"/>
-            <a:r>
-              <a:rPr lang="es-ES" sz="1100" dirty="0" err="1" smtClean="0"/>
-              <a:t>df_2_list_of_tuples_proteins_dict</a:t>
-            </a:r>
-            <a:endParaRPr lang="es-ES" sz="1100" dirty="0"/>
-          </a:p>
-        </p:txBody>
-      </p:sp>
-      <p:sp>
-        <p:nvSpPr>
-          <p:cNvPr id="33" name="32 Rectángulo"/>
-          <p:cNvSpPr/>
-          <p:nvPr/>
-        </p:nvSpPr>
-        <p:spPr>
-          <a:xfrm>
-            <a:off x="2550662" y="5854314"/>
-            <a:ext cx="1078244" cy="184666"/>
-          </a:xfrm>
-          <a:prstGeom prst="rect">
-            <a:avLst/>
-          </a:prstGeom>
-        </p:spPr>
-        <p:txBody>
-          <a:bodyPr wrap="none" lIns="0" tIns="0" rIns="0" bIns="0">
-            <a:spAutoFit/>
-          </a:bodyPr>
-          <a:lstStyle/>
-          <a:p>
-            <a:pPr algn="ctr"/>
-            <a:r>
-              <a:rPr lang="es-ES" sz="1200" dirty="0" err="1" smtClean="0"/>
-              <a:t>insert_prot_code</a:t>
-            </a:r>
-            <a:endParaRPr lang="es-ES" sz="1200" dirty="0"/>
-          </a:p>
-        </p:txBody>
-      </p:sp>
-      <p:sp>
-        <p:nvSpPr>
-          <p:cNvPr id="34" name="33 Rectángulo"/>
-          <p:cNvSpPr/>
-          <p:nvPr/>
-        </p:nvSpPr>
-        <p:spPr>
-          <a:xfrm>
-            <a:off x="2774954" y="5346952"/>
-            <a:ext cx="629660" cy="184666"/>
-          </a:xfrm>
-          <a:prstGeom prst="rect">
-            <a:avLst/>
-          </a:prstGeom>
-        </p:spPr>
-        <p:txBody>
-          <a:bodyPr wrap="none" lIns="0" tIns="0" rIns="0" bIns="0">
-            <a:spAutoFit/>
-          </a:bodyPr>
-          <a:lstStyle/>
-          <a:p>
-            <a:pPr algn="ctr"/>
-            <a:r>
-              <a:rPr lang="es-ES" sz="1200" dirty="0" err="1" smtClean="0"/>
-              <a:t>create_db</a:t>
-            </a:r>
-            <a:endParaRPr lang="es-ES" sz="1200" dirty="0"/>
-          </a:p>
-        </p:txBody>
-      </p:sp>
       <p:sp>
         <p:nvSpPr>
           <p:cNvPr id="35" name="Rectangle 3"/>
@@ -5910,70 +5685,690 @@
           </a:fontRef>
         </p:style>
       </p:cxnSp>
-      <p:sp>
-        <p:nvSpPr>
-          <p:cNvPr id="37" name="36 Rectángulo"/>
-          <p:cNvSpPr/>
+      <p:grpSp>
+        <p:nvGrpSpPr>
+          <p:cNvPr id="2" name="1 Grupo"/>
+          <p:cNvGrpSpPr/>
           <p:nvPr/>
-        </p:nvSpPr>
-        <p:spPr>
-          <a:xfrm>
-            <a:off x="2355820" y="6093876"/>
-            <a:ext cx="1517915" cy="184666"/>
+        </p:nvGrpSpPr>
+        <p:grpSpPr>
+          <a:xfrm>
+            <a:off x="1937296" y="5083716"/>
+            <a:ext cx="2283048" cy="1774284"/>
+            <a:chOff x="1937296" y="5083716"/>
+            <a:chExt cx="2283048" cy="1774284"/>
+          </a:xfrm>
+        </p:grpSpPr>
+        <p:grpSp>
+          <p:nvGrpSpPr>
+            <p:cNvPr id="28" name="27 Grupo"/>
+            <p:cNvGrpSpPr/>
+            <p:nvPr/>
+          </p:nvGrpSpPr>
+          <p:grpSpPr>
+            <a:xfrm>
+              <a:off x="1937296" y="5083716"/>
+              <a:ext cx="2283048" cy="1774284"/>
+              <a:chOff x="2051175" y="1166811"/>
+              <a:chExt cx="1757677" cy="1398521"/>
+            </a:xfrm>
+          </p:grpSpPr>
+          <p:sp>
+            <p:nvSpPr>
+              <p:cNvPr id="29" name="28 Rectángulo"/>
+              <p:cNvSpPr/>
+              <p:nvPr/>
+            </p:nvSpPr>
+            <p:spPr>
+              <a:xfrm>
+                <a:off x="2051175" y="1166811"/>
+                <a:ext cx="1756361" cy="198006"/>
+              </a:xfrm>
+              <a:prstGeom prst="rect">
+                <a:avLst/>
+              </a:prstGeom>
+              <a:noFill/>
+            </p:spPr>
+            <p:style>
+              <a:lnRef idx="2">
+                <a:schemeClr val="accent1">
+                  <a:shade val="50000"/>
+                </a:schemeClr>
+              </a:lnRef>
+              <a:fillRef idx="1">
+                <a:schemeClr val="accent1"/>
+              </a:fillRef>
+              <a:effectRef idx="0">
+                <a:schemeClr val="accent1"/>
+              </a:effectRef>
+              <a:fontRef idx="minor">
+                <a:schemeClr val="lt1"/>
+              </a:fontRef>
+            </p:style>
+            <p:txBody>
+              <a:bodyPr lIns="0" tIns="0" rIns="0" bIns="0" rtlCol="0" anchor="ctr"/>
+              <a:lstStyle/>
+              <a:p>
+                <a:pPr algn="ctr"/>
+                <a:endParaRPr lang="es-ES" sz="1200"/>
+              </a:p>
+            </p:txBody>
+          </p:sp>
+          <p:sp>
+            <p:nvSpPr>
+              <p:cNvPr id="30" name="29 Rectángulo"/>
+              <p:cNvSpPr/>
+              <p:nvPr/>
+            </p:nvSpPr>
+            <p:spPr>
+              <a:xfrm>
+                <a:off x="2052491" y="1362992"/>
+                <a:ext cx="1756361" cy="1202340"/>
+              </a:xfrm>
+              <a:prstGeom prst="rect">
+                <a:avLst/>
+              </a:prstGeom>
+              <a:noFill/>
+            </p:spPr>
+            <p:style>
+              <a:lnRef idx="2">
+                <a:schemeClr val="accent1">
+                  <a:shade val="50000"/>
+                </a:schemeClr>
+              </a:lnRef>
+              <a:fillRef idx="1">
+                <a:schemeClr val="accent1"/>
+              </a:fillRef>
+              <a:effectRef idx="0">
+                <a:schemeClr val="accent1"/>
+              </a:effectRef>
+              <a:fontRef idx="minor">
+                <a:schemeClr val="lt1"/>
+              </a:fontRef>
+            </p:style>
+            <p:txBody>
+              <a:bodyPr lIns="0" tIns="0" rIns="0" bIns="0" rtlCol="0" anchor="ctr"/>
+              <a:lstStyle/>
+              <a:p>
+                <a:pPr algn="ctr"/>
+                <a:endParaRPr lang="es-ES" sz="1200"/>
+              </a:p>
+            </p:txBody>
+          </p:sp>
+        </p:grpSp>
+        <p:sp>
+          <p:nvSpPr>
+            <p:cNvPr id="31" name="30 Rectángulo"/>
+            <p:cNvSpPr/>
+            <p:nvPr/>
+          </p:nvSpPr>
+          <p:spPr>
+            <a:xfrm>
+              <a:off x="2460319" y="5086562"/>
+              <a:ext cx="1107931" cy="184666"/>
+            </a:xfrm>
+            <a:prstGeom prst="rect">
+              <a:avLst/>
+            </a:prstGeom>
+          </p:spPr>
+          <p:txBody>
+            <a:bodyPr wrap="none" lIns="0" tIns="0" rIns="0" bIns="0">
+              <a:spAutoFit/>
+            </a:bodyPr>
+            <a:lstStyle/>
+            <a:p>
+              <a:pPr lvl="0" algn="ctr"/>
+              <a:r>
+                <a:rPr lang="es-ES" sz="1200" b="1" dirty="0" err="1" smtClean="0">
+                  <a:solidFill>
+                    <a:prstClr val="black"/>
+                  </a:solidFill>
+                </a:rPr>
+                <a:t>sqlite_request.py</a:t>
+              </a:r>
+              <a:endParaRPr lang="en-US" sz="1100" b="1" dirty="0">
+                <a:solidFill>
+                  <a:prstClr val="black"/>
+                </a:solidFill>
+              </a:endParaRPr>
+            </a:p>
+          </p:txBody>
+        </p:sp>
+        <p:sp>
+          <p:nvSpPr>
+            <p:cNvPr id="32" name="31 Rectángulo"/>
+            <p:cNvSpPr/>
+            <p:nvPr/>
+          </p:nvSpPr>
+          <p:spPr>
+            <a:xfrm>
+              <a:off x="2123975" y="5601957"/>
+              <a:ext cx="1931618" cy="169277"/>
+            </a:xfrm>
+            <a:prstGeom prst="rect">
+              <a:avLst/>
+            </a:prstGeom>
+          </p:spPr>
+          <p:txBody>
+            <a:bodyPr wrap="none" lIns="0" tIns="0" rIns="0" bIns="0">
+              <a:spAutoFit/>
+            </a:bodyPr>
+            <a:lstStyle/>
+            <a:p>
+              <a:pPr algn="ctr"/>
+              <a:r>
+                <a:rPr lang="es-ES" sz="1100" dirty="0" err="1" smtClean="0"/>
+                <a:t>df_2_list_of_tuples_proteins_dict</a:t>
+              </a:r>
+              <a:endParaRPr lang="es-ES" sz="1100" dirty="0"/>
+            </a:p>
+          </p:txBody>
+        </p:sp>
+        <p:sp>
+          <p:nvSpPr>
+            <p:cNvPr id="33" name="32 Rectángulo"/>
+            <p:cNvSpPr/>
+            <p:nvPr/>
+          </p:nvSpPr>
+          <p:spPr>
+            <a:xfrm>
+              <a:off x="2550662" y="5854314"/>
+              <a:ext cx="1078244" cy="184666"/>
+            </a:xfrm>
+            <a:prstGeom prst="rect">
+              <a:avLst/>
+            </a:prstGeom>
+          </p:spPr>
+          <p:txBody>
+            <a:bodyPr wrap="none" lIns="0" tIns="0" rIns="0" bIns="0">
+              <a:spAutoFit/>
+            </a:bodyPr>
+            <a:lstStyle/>
+            <a:p>
+              <a:pPr algn="ctr"/>
+              <a:r>
+                <a:rPr lang="es-ES" sz="1200" dirty="0" err="1" smtClean="0"/>
+                <a:t>insert_prot_code</a:t>
+              </a:r>
+              <a:endParaRPr lang="es-ES" sz="1200" dirty="0"/>
+            </a:p>
+          </p:txBody>
+        </p:sp>
+        <p:sp>
+          <p:nvSpPr>
+            <p:cNvPr id="34" name="33 Rectángulo"/>
+            <p:cNvSpPr/>
+            <p:nvPr/>
+          </p:nvSpPr>
+          <p:spPr>
+            <a:xfrm>
+              <a:off x="2774954" y="5346952"/>
+              <a:ext cx="629660" cy="184666"/>
+            </a:xfrm>
+            <a:prstGeom prst="rect">
+              <a:avLst/>
+            </a:prstGeom>
+          </p:spPr>
+          <p:txBody>
+            <a:bodyPr wrap="none" lIns="0" tIns="0" rIns="0" bIns="0">
+              <a:spAutoFit/>
+            </a:bodyPr>
+            <a:lstStyle/>
+            <a:p>
+              <a:pPr algn="ctr"/>
+              <a:r>
+                <a:rPr lang="es-ES" sz="1200" dirty="0" err="1" smtClean="0"/>
+                <a:t>create_db</a:t>
+              </a:r>
+              <a:endParaRPr lang="es-ES" sz="1200" dirty="0"/>
+            </a:p>
+          </p:txBody>
+        </p:sp>
+        <p:sp>
+          <p:nvSpPr>
+            <p:cNvPr id="37" name="36 Rectángulo"/>
+            <p:cNvSpPr/>
+            <p:nvPr/>
+          </p:nvSpPr>
+          <p:spPr>
+            <a:xfrm>
+              <a:off x="2355820" y="6093876"/>
+              <a:ext cx="1517915" cy="184666"/>
+            </a:xfrm>
+            <a:prstGeom prst="rect">
+              <a:avLst/>
+            </a:prstGeom>
+          </p:spPr>
+          <p:txBody>
+            <a:bodyPr wrap="none" lIns="0" tIns="0" rIns="0" bIns="0">
+              <a:spAutoFit/>
+            </a:bodyPr>
+            <a:lstStyle/>
+            <a:p>
+              <a:pPr algn="ctr"/>
+              <a:r>
+                <a:rPr lang="es-ES" sz="1200" dirty="0" err="1" smtClean="0"/>
+                <a:t>table_request_prot_dict</a:t>
+              </a:r>
+              <a:endParaRPr lang="es-ES" sz="1200" dirty="0"/>
+            </a:p>
+          </p:txBody>
+        </p:sp>
+        <p:sp>
+          <p:nvSpPr>
+            <p:cNvPr id="38" name="37 Rectángulo"/>
+            <p:cNvSpPr/>
+            <p:nvPr/>
+          </p:nvSpPr>
+          <p:spPr>
+            <a:xfrm>
+              <a:off x="2341652" y="6453336"/>
+              <a:ext cx="1442767" cy="184666"/>
+            </a:xfrm>
+            <a:prstGeom prst="rect">
+              <a:avLst/>
+            </a:prstGeom>
+          </p:spPr>
+          <p:txBody>
+            <a:bodyPr wrap="none" lIns="0" tIns="0" rIns="0" bIns="0">
+              <a:spAutoFit/>
+            </a:bodyPr>
+            <a:lstStyle/>
+            <a:p>
+              <a:pPr algn="ctr"/>
+              <a:r>
+                <a:rPr lang="es-ES" sz="1200" dirty="0" err="1" smtClean="0"/>
+                <a:t>creqate_table_protein</a:t>
+              </a:r>
+              <a:r>
+                <a:rPr lang="es-ES" sz="1200" smtClean="0"/>
+                <a:t>-</a:t>
+              </a:r>
+              <a:endParaRPr lang="es-ES" sz="1200" dirty="0"/>
+            </a:p>
+          </p:txBody>
+        </p:sp>
+      </p:grpSp>
+      <p:grpSp>
+        <p:nvGrpSpPr>
+          <p:cNvPr id="39" name="38 Grupo"/>
+          <p:cNvGrpSpPr/>
+          <p:nvPr/>
+        </p:nvGrpSpPr>
+        <p:grpSpPr>
+          <a:xfrm>
+            <a:off x="5905456" y="5163227"/>
+            <a:ext cx="2283048" cy="1290109"/>
+            <a:chOff x="1937296" y="5083716"/>
+            <a:chExt cx="2283048" cy="1290109"/>
+          </a:xfrm>
+        </p:grpSpPr>
+        <p:grpSp>
+          <p:nvGrpSpPr>
+            <p:cNvPr id="40" name="39 Grupo"/>
+            <p:cNvGrpSpPr/>
+            <p:nvPr/>
+          </p:nvGrpSpPr>
+          <p:grpSpPr>
+            <a:xfrm>
+              <a:off x="1937296" y="5083716"/>
+              <a:ext cx="2283048" cy="1290109"/>
+              <a:chOff x="2051175" y="1166811"/>
+              <a:chExt cx="1757677" cy="1016886"/>
+            </a:xfrm>
+          </p:grpSpPr>
+          <p:sp>
+            <p:nvSpPr>
+              <p:cNvPr id="47" name="46 Rectángulo"/>
+              <p:cNvSpPr/>
+              <p:nvPr/>
+            </p:nvSpPr>
+            <p:spPr>
+              <a:xfrm>
+                <a:off x="2051175" y="1166811"/>
+                <a:ext cx="1756361" cy="198006"/>
+              </a:xfrm>
+              <a:prstGeom prst="rect">
+                <a:avLst/>
+              </a:prstGeom>
+              <a:noFill/>
+            </p:spPr>
+            <p:style>
+              <a:lnRef idx="2">
+                <a:schemeClr val="accent1">
+                  <a:shade val="50000"/>
+                </a:schemeClr>
+              </a:lnRef>
+              <a:fillRef idx="1">
+                <a:schemeClr val="accent1"/>
+              </a:fillRef>
+              <a:effectRef idx="0">
+                <a:schemeClr val="accent1"/>
+              </a:effectRef>
+              <a:fontRef idx="minor">
+                <a:schemeClr val="lt1"/>
+              </a:fontRef>
+            </p:style>
+            <p:txBody>
+              <a:bodyPr lIns="0" tIns="0" rIns="0" bIns="0" rtlCol="0" anchor="ctr"/>
+              <a:lstStyle/>
+              <a:p>
+                <a:pPr algn="ctr"/>
+                <a:endParaRPr lang="es-ES" sz="1200"/>
+              </a:p>
+            </p:txBody>
+          </p:sp>
+          <p:sp>
+            <p:nvSpPr>
+              <p:cNvPr id="48" name="47 Rectángulo"/>
+              <p:cNvSpPr/>
+              <p:nvPr/>
+            </p:nvSpPr>
+            <p:spPr>
+              <a:xfrm>
+                <a:off x="2052491" y="1362992"/>
+                <a:ext cx="1756361" cy="820705"/>
+              </a:xfrm>
+              <a:prstGeom prst="rect">
+                <a:avLst/>
+              </a:prstGeom>
+              <a:noFill/>
+            </p:spPr>
+            <p:style>
+              <a:lnRef idx="2">
+                <a:schemeClr val="accent1">
+                  <a:shade val="50000"/>
+                </a:schemeClr>
+              </a:lnRef>
+              <a:fillRef idx="1">
+                <a:schemeClr val="accent1"/>
+              </a:fillRef>
+              <a:effectRef idx="0">
+                <a:schemeClr val="accent1"/>
+              </a:effectRef>
+              <a:fontRef idx="minor">
+                <a:schemeClr val="lt1"/>
+              </a:fontRef>
+            </p:style>
+            <p:txBody>
+              <a:bodyPr lIns="0" tIns="0" rIns="0" bIns="0" rtlCol="0" anchor="ctr"/>
+              <a:lstStyle/>
+              <a:p>
+                <a:pPr algn="ctr"/>
+                <a:endParaRPr lang="es-ES" sz="1200"/>
+              </a:p>
+            </p:txBody>
+          </p:sp>
+        </p:grpSp>
+        <p:sp>
+          <p:nvSpPr>
+            <p:cNvPr id="41" name="40 Rectángulo"/>
+            <p:cNvSpPr/>
+            <p:nvPr/>
+          </p:nvSpPr>
+          <p:spPr>
+            <a:xfrm>
+              <a:off x="2376834" y="5086562"/>
+              <a:ext cx="1274901" cy="184666"/>
+            </a:xfrm>
+            <a:prstGeom prst="rect">
+              <a:avLst/>
+            </a:prstGeom>
+          </p:spPr>
+          <p:txBody>
+            <a:bodyPr wrap="none" lIns="0" tIns="0" rIns="0" bIns="0">
+              <a:spAutoFit/>
+            </a:bodyPr>
+            <a:lstStyle/>
+            <a:p>
+              <a:pPr lvl="0" algn="ctr"/>
+              <a:r>
+                <a:rPr lang="es-ES" sz="1200" b="1" dirty="0" smtClean="0">
+                  <a:solidFill>
+                    <a:prstClr val="black"/>
+                  </a:solidFill>
+                </a:rPr>
+                <a:t>pd_maldi_match</a:t>
+              </a:r>
+              <a:r>
+                <a:rPr lang="es-ES" sz="1200" b="1" dirty="0" smtClean="0">
+                  <a:solidFill>
+                    <a:prstClr val="black"/>
+                  </a:solidFill>
+                </a:rPr>
+                <a:t>.py</a:t>
+              </a:r>
+              <a:endParaRPr lang="en-US" sz="1100" b="1" dirty="0">
+                <a:solidFill>
+                  <a:prstClr val="black"/>
+                </a:solidFill>
+              </a:endParaRPr>
+            </a:p>
+          </p:txBody>
+        </p:sp>
+        <p:sp>
+          <p:nvSpPr>
+            <p:cNvPr id="42" name="41 Rectángulo"/>
+            <p:cNvSpPr/>
+            <p:nvPr/>
+          </p:nvSpPr>
+          <p:spPr>
+            <a:xfrm>
+              <a:off x="2344387" y="5601957"/>
+              <a:ext cx="1490793" cy="169277"/>
+            </a:xfrm>
+            <a:prstGeom prst="rect">
+              <a:avLst/>
+            </a:prstGeom>
+          </p:spPr>
+          <p:txBody>
+            <a:bodyPr wrap="none" lIns="0" tIns="0" rIns="0" bIns="0">
+              <a:spAutoFit/>
+            </a:bodyPr>
+            <a:lstStyle/>
+            <a:p>
+              <a:pPr algn="ctr"/>
+              <a:r>
+                <a:rPr lang="es-ES" sz="1100" dirty="0" err="1" smtClean="0"/>
+                <a:t>complete_table_proteins</a:t>
+              </a:r>
+              <a:endParaRPr lang="es-ES" sz="1100" dirty="0"/>
+            </a:p>
+          </p:txBody>
+        </p:sp>
+        <p:sp>
+          <p:nvSpPr>
+            <p:cNvPr id="43" name="42 Rectángulo"/>
+            <p:cNvSpPr/>
+            <p:nvPr/>
+          </p:nvSpPr>
+          <p:spPr>
+            <a:xfrm>
+              <a:off x="2560694" y="5854314"/>
+              <a:ext cx="1058175" cy="184666"/>
+            </a:xfrm>
+            <a:prstGeom prst="rect">
+              <a:avLst/>
+            </a:prstGeom>
+          </p:spPr>
+          <p:txBody>
+            <a:bodyPr wrap="none" lIns="0" tIns="0" rIns="0" bIns="0">
+              <a:spAutoFit/>
+            </a:bodyPr>
+            <a:lstStyle/>
+            <a:p>
+              <a:pPr algn="ctr"/>
+              <a:r>
+                <a:rPr lang="es-ES" sz="1200" dirty="0" err="1" smtClean="0"/>
+                <a:t>maldi_ident_join</a:t>
+              </a:r>
+              <a:endParaRPr lang="es-ES" sz="1200" dirty="0"/>
+            </a:p>
+          </p:txBody>
+        </p:sp>
+        <p:sp>
+          <p:nvSpPr>
+            <p:cNvPr id="44" name="43 Rectángulo"/>
+            <p:cNvSpPr/>
+            <p:nvPr/>
+          </p:nvSpPr>
+          <p:spPr>
+            <a:xfrm>
+              <a:off x="2569965" y="5346952"/>
+              <a:ext cx="1039644" cy="184666"/>
+            </a:xfrm>
+            <a:prstGeom prst="rect">
+              <a:avLst/>
+            </a:prstGeom>
+          </p:spPr>
+          <p:txBody>
+            <a:bodyPr wrap="none" lIns="0" tIns="0" rIns="0" bIns="0">
+              <a:spAutoFit/>
+            </a:bodyPr>
+            <a:lstStyle/>
+            <a:p>
+              <a:pPr algn="ctr"/>
+              <a:r>
+                <a:rPr lang="es-ES" sz="1200" dirty="0" err="1" smtClean="0"/>
+                <a:t>split_description</a:t>
+              </a:r>
+              <a:endParaRPr lang="es-ES" sz="1200" dirty="0"/>
+            </a:p>
+          </p:txBody>
+        </p:sp>
+        <p:sp>
+          <p:nvSpPr>
+            <p:cNvPr id="45" name="44 Rectángulo"/>
+            <p:cNvSpPr/>
+            <p:nvPr/>
+          </p:nvSpPr>
+          <p:spPr>
+            <a:xfrm>
+              <a:off x="2669430" y="6093876"/>
+              <a:ext cx="890693" cy="184666"/>
+            </a:xfrm>
+            <a:prstGeom prst="rect">
+              <a:avLst/>
+            </a:prstGeom>
+          </p:spPr>
+          <p:txBody>
+            <a:bodyPr wrap="none" lIns="0" tIns="0" rIns="0" bIns="0">
+              <a:spAutoFit/>
+            </a:bodyPr>
+            <a:lstStyle/>
+            <a:p>
+              <a:pPr algn="ctr"/>
+              <a:r>
+                <a:rPr lang="es-ES" sz="1200" dirty="0" err="1" smtClean="0"/>
+                <a:t>xml_complete</a:t>
+              </a:r>
+              <a:endParaRPr lang="es-ES" sz="1200" dirty="0"/>
+            </a:p>
+          </p:txBody>
+        </p:sp>
+      </p:grpSp>
+      <p:sp>
+        <p:nvSpPr>
+          <p:cNvPr id="3" name="Rectangle 1"/>
+          <p:cNvSpPr>
+            <a:spLocks noChangeArrowheads="1"/>
+          </p:cNvSpPr>
+          <p:nvPr/>
+        </p:nvSpPr>
+        <p:spPr bwMode="auto">
+          <a:xfrm>
+            <a:off x="5483335" y="4293096"/>
+            <a:ext cx="2977097" cy="553998"/>
           </a:xfrm>
           <a:prstGeom prst="rect">
             <a:avLst/>
           </a:prstGeom>
-        </p:spPr>
-        <p:txBody>
-          <a:bodyPr wrap="none" lIns="0" tIns="0" rIns="0" bIns="0">
+          <a:noFill/>
+        </p:spPr>
+        <p:txBody>
+          <a:bodyPr wrap="none" lIns="0" tIns="0" rIns="0" bIns="0" rtlCol="0">
             <a:spAutoFit/>
           </a:bodyPr>
           <a:lstStyle/>
           <a:p>
             <a:pPr algn="ctr"/>
             <a:r>
-              <a:rPr lang="es-ES" sz="1200" dirty="0" err="1" smtClean="0"/>
-              <a:t>table_request_prot_dict</a:t>
-            </a:r>
-            <a:endParaRPr lang="es-ES" sz="1200" dirty="0"/>
-          </a:p>
-        </p:txBody>
-      </p:sp>
-      <p:sp>
-        <p:nvSpPr>
-          <p:cNvPr id="38" name="37 Rectángulo"/>
-          <p:cNvSpPr/>
+              <a:rPr lang="en-US" altLang="en-US" sz="1200" dirty="0" smtClean="0"/>
+              <a:t>mcE61_Figueres.xml</a:t>
+            </a:r>
+            <a:r>
+              <a:rPr lang="en-US" altLang="en-US" sz="1200" dirty="0"/>
+              <a:t/>
+            </a:r>
+            <a:br>
+              <a:rPr lang="en-US" altLang="en-US" sz="1200" dirty="0"/>
+            </a:br>
+            <a:r>
+              <a:rPr lang="en-US" altLang="en-US" sz="1200" dirty="0"/>
+              <a:t> </a:t>
+            </a:r>
+            <a:r>
+              <a:rPr lang="en-US" altLang="en-US" sz="1200" dirty="0" err="1" smtClean="0"/>
+              <a:t>test_files</a:t>
+            </a:r>
+            <a:r>
+              <a:rPr lang="en-US" altLang="en-US" sz="1200" dirty="0" smtClean="0"/>
+              <a:t>/mcE61_PD14_Figueres_Peptides.xlsx</a:t>
+            </a:r>
+            <a:r>
+              <a:rPr lang="en-US" altLang="en-US" sz="1200" dirty="0"/>
+              <a:t/>
+            </a:r>
+            <a:br>
+              <a:rPr lang="en-US" altLang="en-US" sz="1200" dirty="0"/>
+            </a:br>
+            <a:r>
+              <a:rPr lang="en-US" altLang="en-US" sz="1200" dirty="0" err="1" smtClean="0"/>
+              <a:t>test_files</a:t>
+            </a:r>
+            <a:r>
+              <a:rPr lang="en-US" altLang="en-US" sz="1200" dirty="0" smtClean="0"/>
+              <a:t>/mcE61_PD14_Figueres_Proteins.xlsx</a:t>
+            </a:r>
+            <a:endParaRPr lang="en-US" altLang="en-US" sz="1200" dirty="0"/>
+          </a:p>
+        </p:txBody>
+      </p:sp>
+      <p:cxnSp>
+        <p:nvCxnSpPr>
+          <p:cNvPr id="49" name="48 Conector recto de flecha"/>
+          <p:cNvCxnSpPr>
+            <a:stCxn id="3" idx="2"/>
+          </p:cNvCxnSpPr>
           <p:nvPr/>
-        </p:nvSpPr>
-        <p:spPr>
-          <a:xfrm>
-            <a:off x="2341652" y="6453336"/>
-            <a:ext cx="1442767" cy="184666"/>
-          </a:xfrm>
-          <a:prstGeom prst="rect">
+        </p:nvCxnSpPr>
+        <p:spPr>
+          <a:xfrm flipH="1">
+            <a:off x="6971883" y="4847094"/>
+            <a:ext cx="1" cy="308628"/>
+          </a:xfrm>
+          <a:prstGeom prst="straightConnector1">
             <a:avLst/>
           </a:prstGeom>
-        </p:spPr>
-        <p:txBody>
-          <a:bodyPr wrap="none" lIns="0" tIns="0" rIns="0" bIns="0">
-            <a:spAutoFit/>
-          </a:bodyPr>
-          <a:lstStyle/>
-          <a:p>
-            <a:pPr algn="ctr"/>
-            <a:r>
-              <a:rPr lang="es-ES" sz="1200" dirty="0" err="1" smtClean="0"/>
-              <a:t>creqate_table_protein</a:t>
-            </a:r>
-            <a:r>
-              <a:rPr lang="es-ES" sz="1200" smtClean="0"/>
-              <a:t>-</a:t>
-            </a:r>
-            <a:endParaRPr lang="es-ES" sz="1200" dirty="0"/>
-          </a:p>
-        </p:txBody>
-      </p:sp>
+          <a:ln>
+            <a:tailEnd type="arrow"/>
+          </a:ln>
+        </p:spPr>
+        <p:style>
+          <a:lnRef idx="1">
+            <a:schemeClr val="accent1"/>
+          </a:lnRef>
+          <a:fillRef idx="0">
+            <a:schemeClr val="accent1"/>
+          </a:fillRef>
+          <a:effectRef idx="0">
+            <a:schemeClr val="accent1"/>
+          </a:effectRef>
+          <a:fontRef idx="minor">
+            <a:schemeClr val="tx1"/>
+          </a:fontRef>
+        </p:style>
+      </p:cxnSp>
     </p:spTree>
     <p:extLst>
       <p:ext uri="{BB962C8B-B14F-4D97-AF65-F5344CB8AC3E}">

</xml_diff>

<commit_message>
One module per day added to the scheme !
</commit_message>
<xml_diff>
--- a/docs/Summary.pptx
+++ b/docs/Summary.pptx
@@ -289,7 +289,7 @@
           <a:p>
             <a:fld id="{7A847CFC-816F-41D0-AAC0-9BF4FEBC753E}" type="datetimeFigureOut">
               <a:rPr lang="es-ES" smtClean="0"/>
-              <a:t>01/03/2022</a:t>
+              <a:t>02/03/2022</a:t>
             </a:fld>
             <a:endParaRPr lang="es-ES"/>
           </a:p>
@@ -454,7 +454,7 @@
           <a:p>
             <a:fld id="{7A847CFC-816F-41D0-AAC0-9BF4FEBC753E}" type="datetimeFigureOut">
               <a:rPr lang="es-ES" smtClean="0"/>
-              <a:t>01/03/2022</a:t>
+              <a:t>02/03/2022</a:t>
             </a:fld>
             <a:endParaRPr lang="es-ES"/>
           </a:p>
@@ -629,7 +629,7 @@
           <a:p>
             <a:fld id="{7A847CFC-816F-41D0-AAC0-9BF4FEBC753E}" type="datetimeFigureOut">
               <a:rPr lang="es-ES" smtClean="0"/>
-              <a:t>01/03/2022</a:t>
+              <a:t>02/03/2022</a:t>
             </a:fld>
             <a:endParaRPr lang="es-ES"/>
           </a:p>
@@ -794,7 +794,7 @@
           <a:p>
             <a:fld id="{7A847CFC-816F-41D0-AAC0-9BF4FEBC753E}" type="datetimeFigureOut">
               <a:rPr lang="es-ES" smtClean="0"/>
-              <a:t>01/03/2022</a:t>
+              <a:t>02/03/2022</a:t>
             </a:fld>
             <a:endParaRPr lang="es-ES"/>
           </a:p>
@@ -1035,7 +1035,7 @@
           <a:p>
             <a:fld id="{7A847CFC-816F-41D0-AAC0-9BF4FEBC753E}" type="datetimeFigureOut">
               <a:rPr lang="es-ES" smtClean="0"/>
-              <a:t>01/03/2022</a:t>
+              <a:t>02/03/2022</a:t>
             </a:fld>
             <a:endParaRPr lang="es-ES"/>
           </a:p>
@@ -1318,7 +1318,7 @@
           <a:p>
             <a:fld id="{7A847CFC-816F-41D0-AAC0-9BF4FEBC753E}" type="datetimeFigureOut">
               <a:rPr lang="es-ES" smtClean="0"/>
-              <a:t>01/03/2022</a:t>
+              <a:t>02/03/2022</a:t>
             </a:fld>
             <a:endParaRPr lang="es-ES"/>
           </a:p>
@@ -1735,7 +1735,7 @@
           <a:p>
             <a:fld id="{7A847CFC-816F-41D0-AAC0-9BF4FEBC753E}" type="datetimeFigureOut">
               <a:rPr lang="es-ES" smtClean="0"/>
-              <a:t>01/03/2022</a:t>
+              <a:t>02/03/2022</a:t>
             </a:fld>
             <a:endParaRPr lang="es-ES"/>
           </a:p>
@@ -1848,7 +1848,7 @@
           <a:p>
             <a:fld id="{7A847CFC-816F-41D0-AAC0-9BF4FEBC753E}" type="datetimeFigureOut">
               <a:rPr lang="es-ES" smtClean="0"/>
-              <a:t>01/03/2022</a:t>
+              <a:t>02/03/2022</a:t>
             </a:fld>
             <a:endParaRPr lang="es-ES"/>
           </a:p>
@@ -1938,7 +1938,7 @@
           <a:p>
             <a:fld id="{7A847CFC-816F-41D0-AAC0-9BF4FEBC753E}" type="datetimeFigureOut">
               <a:rPr lang="es-ES" smtClean="0"/>
-              <a:t>01/03/2022</a:t>
+              <a:t>02/03/2022</a:t>
             </a:fld>
             <a:endParaRPr lang="es-ES"/>
           </a:p>
@@ -2210,7 +2210,7 @@
           <a:p>
             <a:fld id="{7A847CFC-816F-41D0-AAC0-9BF4FEBC753E}" type="datetimeFigureOut">
               <a:rPr lang="es-ES" smtClean="0"/>
-              <a:t>01/03/2022</a:t>
+              <a:t>02/03/2022</a:t>
             </a:fld>
             <a:endParaRPr lang="es-ES"/>
           </a:p>
@@ -2458,7 +2458,7 @@
           <a:p>
             <a:fld id="{7A847CFC-816F-41D0-AAC0-9BF4FEBC753E}" type="datetimeFigureOut">
               <a:rPr lang="es-ES" smtClean="0"/>
-              <a:t>01/03/2022</a:t>
+              <a:t>02/03/2022</a:t>
             </a:fld>
             <a:endParaRPr lang="es-ES"/>
           </a:p>
@@ -2666,7 +2666,7 @@
           <a:p>
             <a:fld id="{7A847CFC-816F-41D0-AAC0-9BF4FEBC753E}" type="datetimeFigureOut">
               <a:rPr lang="es-ES" smtClean="0"/>
-              <a:t>01/03/2022</a:t>
+              <a:t>02/03/2022</a:t>
             </a:fld>
             <a:endParaRPr lang="es-ES"/>
           </a:p>
@@ -4757,103 +4757,6 @@
           <a:chExt cx="0" cy="0"/>
         </a:xfrm>
       </p:grpSpPr>
-      <p:grpSp>
-        <p:nvGrpSpPr>
-          <p:cNvPr id="17" name="16 Grupo"/>
-          <p:cNvGrpSpPr/>
-          <p:nvPr/>
-        </p:nvGrpSpPr>
-        <p:grpSpPr>
-          <a:xfrm>
-            <a:off x="1784896" y="3427530"/>
-            <a:ext cx="2067024" cy="1032222"/>
-            <a:chOff x="2051174" y="1166809"/>
-            <a:chExt cx="1757678" cy="813615"/>
-          </a:xfrm>
-        </p:grpSpPr>
-        <p:sp>
-          <p:nvSpPr>
-            <p:cNvPr id="18" name="17 Rectángulo"/>
-            <p:cNvSpPr/>
-            <p:nvPr/>
-          </p:nvSpPr>
-          <p:spPr>
-            <a:xfrm>
-              <a:off x="2051174" y="1166809"/>
-              <a:ext cx="1756361" cy="198007"/>
-            </a:xfrm>
-            <a:prstGeom prst="rect">
-              <a:avLst/>
-            </a:prstGeom>
-            <a:noFill/>
-          </p:spPr>
-          <p:style>
-            <a:lnRef idx="2">
-              <a:schemeClr val="accent1">
-                <a:shade val="50000"/>
-              </a:schemeClr>
-            </a:lnRef>
-            <a:fillRef idx="1">
-              <a:schemeClr val="accent1"/>
-            </a:fillRef>
-            <a:effectRef idx="0">
-              <a:schemeClr val="accent1"/>
-            </a:effectRef>
-            <a:fontRef idx="minor">
-              <a:schemeClr val="lt1"/>
-            </a:fontRef>
-          </p:style>
-          <p:txBody>
-            <a:bodyPr lIns="0" tIns="0" rIns="0" bIns="0" rtlCol="0" anchor="ctr"/>
-            <a:lstStyle/>
-            <a:p>
-              <a:pPr algn="ctr"/>
-              <a:endParaRPr lang="es-ES" sz="1200"/>
-            </a:p>
-          </p:txBody>
-        </p:sp>
-        <p:sp>
-          <p:nvSpPr>
-            <p:cNvPr id="19" name="18 Rectángulo"/>
-            <p:cNvSpPr/>
-            <p:nvPr/>
-          </p:nvSpPr>
-          <p:spPr>
-            <a:xfrm>
-              <a:off x="2052491" y="1362993"/>
-              <a:ext cx="1756361" cy="617431"/>
-            </a:xfrm>
-            <a:prstGeom prst="rect">
-              <a:avLst/>
-            </a:prstGeom>
-            <a:noFill/>
-          </p:spPr>
-          <p:style>
-            <a:lnRef idx="2">
-              <a:schemeClr val="accent1">
-                <a:shade val="50000"/>
-              </a:schemeClr>
-            </a:lnRef>
-            <a:fillRef idx="1">
-              <a:schemeClr val="accent1"/>
-            </a:fillRef>
-            <a:effectRef idx="0">
-              <a:schemeClr val="accent1"/>
-            </a:effectRef>
-            <a:fontRef idx="minor">
-              <a:schemeClr val="lt1"/>
-            </a:fontRef>
-          </p:style>
-          <p:txBody>
-            <a:bodyPr lIns="0" tIns="0" rIns="0" bIns="0" rtlCol="0" anchor="ctr"/>
-            <a:lstStyle/>
-            <a:p>
-              <a:pPr algn="ctr"/>
-              <a:endParaRPr lang="es-ES" sz="1200"/>
-            </a:p>
-          </p:txBody>
-        </p:sp>
-      </p:grpSp>
       <p:sp>
         <p:nvSpPr>
           <p:cNvPr id="4" name="3 CuadroTexto"/>
@@ -5427,134 +5330,246 @@
           </a:p>
         </p:txBody>
       </p:sp>
-      <p:sp>
-        <p:nvSpPr>
-          <p:cNvPr id="15" name="14 Rectángulo"/>
-          <p:cNvSpPr/>
+      <p:grpSp>
+        <p:nvGrpSpPr>
+          <p:cNvPr id="9" name="8 Grupo"/>
+          <p:cNvGrpSpPr/>
           <p:nvPr/>
-        </p:nvSpPr>
-        <p:spPr>
-          <a:xfrm>
-            <a:off x="2098436" y="3460358"/>
-            <a:ext cx="1439945" cy="184666"/>
-          </a:xfrm>
-          <a:prstGeom prst="rect">
-            <a:avLst/>
-          </a:prstGeom>
-        </p:spPr>
-        <p:txBody>
-          <a:bodyPr wrap="none" lIns="0" tIns="0" rIns="0" bIns="0">
-            <a:spAutoFit/>
-          </a:bodyPr>
-          <a:lstStyle/>
-          <a:p>
-            <a:pPr lvl="0" algn="ctr"/>
-            <a:r>
-              <a:rPr lang="es-ES" sz="1200" b="1" dirty="0" err="1">
+        </p:nvGrpSpPr>
+        <p:grpSpPr>
+          <a:xfrm>
+            <a:off x="1784896" y="3427530"/>
+            <a:ext cx="2067024" cy="1032222"/>
+            <a:chOff x="1784896" y="3427530"/>
+            <a:chExt cx="2067024" cy="1032222"/>
+          </a:xfrm>
+        </p:grpSpPr>
+        <p:grpSp>
+          <p:nvGrpSpPr>
+            <p:cNvPr id="17" name="16 Grupo"/>
+            <p:cNvGrpSpPr/>
+            <p:nvPr/>
+          </p:nvGrpSpPr>
+          <p:grpSpPr>
+            <a:xfrm>
+              <a:off x="1784896" y="3427530"/>
+              <a:ext cx="2067024" cy="1032222"/>
+              <a:chOff x="2051174" y="1166809"/>
+              <a:chExt cx="1757678" cy="813615"/>
+            </a:xfrm>
+          </p:grpSpPr>
+          <p:sp>
+            <p:nvSpPr>
+              <p:cNvPr id="18" name="17 Rectángulo"/>
+              <p:cNvSpPr/>
+              <p:nvPr/>
+            </p:nvSpPr>
+            <p:spPr>
+              <a:xfrm>
+                <a:off x="2051174" y="1166809"/>
+                <a:ext cx="1756361" cy="198007"/>
+              </a:xfrm>
+              <a:prstGeom prst="rect">
+                <a:avLst/>
+              </a:prstGeom>
+              <a:noFill/>
+            </p:spPr>
+            <p:style>
+              <a:lnRef idx="2">
+                <a:schemeClr val="accent1">
+                  <a:shade val="50000"/>
+                </a:schemeClr>
+              </a:lnRef>
+              <a:fillRef idx="1">
+                <a:schemeClr val="accent1"/>
+              </a:fillRef>
+              <a:effectRef idx="0">
+                <a:schemeClr val="accent1"/>
+              </a:effectRef>
+              <a:fontRef idx="minor">
+                <a:schemeClr val="lt1"/>
+              </a:fontRef>
+            </p:style>
+            <p:txBody>
+              <a:bodyPr lIns="0" tIns="0" rIns="0" bIns="0" rtlCol="0" anchor="ctr"/>
+              <a:lstStyle/>
+              <a:p>
+                <a:pPr algn="ctr"/>
+                <a:endParaRPr lang="es-ES" sz="1200"/>
+              </a:p>
+            </p:txBody>
+          </p:sp>
+          <p:sp>
+            <p:nvSpPr>
+              <p:cNvPr id="19" name="18 Rectángulo"/>
+              <p:cNvSpPr/>
+              <p:nvPr/>
+            </p:nvSpPr>
+            <p:spPr>
+              <a:xfrm>
+                <a:off x="2052491" y="1362993"/>
+                <a:ext cx="1756361" cy="617431"/>
+              </a:xfrm>
+              <a:prstGeom prst="rect">
+                <a:avLst/>
+              </a:prstGeom>
+              <a:noFill/>
+            </p:spPr>
+            <p:style>
+              <a:lnRef idx="2">
+                <a:schemeClr val="accent1">
+                  <a:shade val="50000"/>
+                </a:schemeClr>
+              </a:lnRef>
+              <a:fillRef idx="1">
+                <a:schemeClr val="accent1"/>
+              </a:fillRef>
+              <a:effectRef idx="0">
+                <a:schemeClr val="accent1"/>
+              </a:effectRef>
+              <a:fontRef idx="minor">
+                <a:schemeClr val="lt1"/>
+              </a:fontRef>
+            </p:style>
+            <p:txBody>
+              <a:bodyPr lIns="0" tIns="0" rIns="0" bIns="0" rtlCol="0" anchor="ctr"/>
+              <a:lstStyle/>
+              <a:p>
+                <a:pPr algn="ctr"/>
+                <a:endParaRPr lang="es-ES" sz="1200"/>
+              </a:p>
+            </p:txBody>
+          </p:sp>
+        </p:grpSp>
+        <p:sp>
+          <p:nvSpPr>
+            <p:cNvPr id="15" name="14 Rectángulo"/>
+            <p:cNvSpPr/>
+            <p:nvPr/>
+          </p:nvSpPr>
+          <p:spPr>
+            <a:xfrm>
+              <a:off x="2098436" y="3460358"/>
+              <a:ext cx="1439945" cy="184666"/>
+            </a:xfrm>
+            <a:prstGeom prst="rect">
+              <a:avLst/>
+            </a:prstGeom>
+          </p:spPr>
+          <p:txBody>
+            <a:bodyPr wrap="none" lIns="0" tIns="0" rIns="0" bIns="0">
+              <a:spAutoFit/>
+            </a:bodyPr>
+            <a:lstStyle/>
+            <a:p>
+              <a:pPr lvl="0" algn="ctr"/>
+              <a:r>
+                <a:rPr lang="es-ES" sz="1200" b="1" dirty="0" err="1">
+                  <a:solidFill>
+                    <a:prstClr val="black"/>
+                  </a:solidFill>
+                </a:rPr>
+                <a:t>pd_table_complete.py</a:t>
+              </a:r>
+              <a:endParaRPr lang="en-US" sz="1100" b="1" dirty="0">
                 <a:solidFill>
                   <a:prstClr val="black"/>
                 </a:solidFill>
-              </a:rPr>
-              <a:t>pd_table_complete.py</a:t>
-            </a:r>
-            <a:endParaRPr lang="en-US" sz="1100" b="1" dirty="0">
-              <a:solidFill>
-                <a:prstClr val="black"/>
-              </a:solidFill>
-            </a:endParaRPr>
-          </a:p>
-        </p:txBody>
-      </p:sp>
-      <p:sp>
-        <p:nvSpPr>
-          <p:cNvPr id="21" name="20 Rectángulo"/>
-          <p:cNvSpPr/>
-          <p:nvPr/>
-        </p:nvSpPr>
-        <p:spPr>
-          <a:xfrm>
-            <a:off x="2182016" y="3960629"/>
-            <a:ext cx="1272784" cy="184666"/>
-          </a:xfrm>
-          <a:prstGeom prst="rect">
-            <a:avLst/>
-          </a:prstGeom>
-        </p:spPr>
-        <p:txBody>
-          <a:bodyPr wrap="none" lIns="0" tIns="0" rIns="0" bIns="0">
-            <a:spAutoFit/>
-          </a:bodyPr>
-          <a:lstStyle/>
-          <a:p>
-            <a:pPr algn="ctr"/>
-            <a:r>
-              <a:rPr lang="es-ES" sz="1200" dirty="0" err="1" smtClean="0"/>
-              <a:t>uniprot_information</a:t>
-            </a:r>
-            <a:endParaRPr lang="es-ES" sz="1200" dirty="0"/>
-          </a:p>
-        </p:txBody>
-      </p:sp>
-      <p:sp>
-        <p:nvSpPr>
-          <p:cNvPr id="23" name="22 Rectángulo"/>
-          <p:cNvSpPr/>
-          <p:nvPr/>
-        </p:nvSpPr>
-        <p:spPr>
-          <a:xfrm>
-            <a:off x="2328306" y="4199063"/>
-            <a:ext cx="980204" cy="184666"/>
-          </a:xfrm>
-          <a:prstGeom prst="rect">
-            <a:avLst/>
-          </a:prstGeom>
-        </p:spPr>
-        <p:txBody>
-          <a:bodyPr wrap="none" lIns="0" tIns="0" rIns="0" bIns="0">
-            <a:spAutoFit/>
-          </a:bodyPr>
-          <a:lstStyle/>
-          <a:p>
-            <a:pPr algn="ctr"/>
-            <a:r>
-              <a:rPr lang="es-ES" sz="1200" dirty="0" err="1" smtClean="0"/>
-              <a:t>table_complete</a:t>
-            </a:r>
-            <a:endParaRPr lang="es-ES" sz="1200" dirty="0"/>
-          </a:p>
-        </p:txBody>
-      </p:sp>
-      <p:sp>
-        <p:nvSpPr>
-          <p:cNvPr id="24" name="23 Rectángulo"/>
-          <p:cNvSpPr/>
-          <p:nvPr/>
-        </p:nvSpPr>
-        <p:spPr>
-          <a:xfrm>
-            <a:off x="2184453" y="3735738"/>
-            <a:ext cx="1267911" cy="184666"/>
-          </a:xfrm>
-          <a:prstGeom prst="rect">
-            <a:avLst/>
-          </a:prstGeom>
-        </p:spPr>
-        <p:txBody>
-          <a:bodyPr wrap="none" lIns="0" tIns="0" rIns="0" bIns="0">
-            <a:spAutoFit/>
-          </a:bodyPr>
-          <a:lstStyle/>
-          <a:p>
-            <a:pPr algn="ctr"/>
-            <a:r>
-              <a:rPr lang="es-ES" sz="1200" dirty="0" err="1" smtClean="0"/>
-              <a:t>protein_information</a:t>
-            </a:r>
-            <a:endParaRPr lang="es-ES" sz="1200" dirty="0"/>
-          </a:p>
-        </p:txBody>
-      </p:sp>
+              </a:endParaRPr>
+            </a:p>
+          </p:txBody>
+        </p:sp>
+        <p:sp>
+          <p:nvSpPr>
+            <p:cNvPr id="21" name="20 Rectángulo"/>
+            <p:cNvSpPr/>
+            <p:nvPr/>
+          </p:nvSpPr>
+          <p:spPr>
+            <a:xfrm>
+              <a:off x="2182016" y="3960629"/>
+              <a:ext cx="1272784" cy="184666"/>
+            </a:xfrm>
+            <a:prstGeom prst="rect">
+              <a:avLst/>
+            </a:prstGeom>
+          </p:spPr>
+          <p:txBody>
+            <a:bodyPr wrap="none" lIns="0" tIns="0" rIns="0" bIns="0">
+              <a:spAutoFit/>
+            </a:bodyPr>
+            <a:lstStyle/>
+            <a:p>
+              <a:pPr algn="ctr"/>
+              <a:r>
+                <a:rPr lang="es-ES" sz="1200" dirty="0" err="1" smtClean="0"/>
+                <a:t>uniprot_information</a:t>
+              </a:r>
+              <a:endParaRPr lang="es-ES" sz="1200" dirty="0"/>
+            </a:p>
+          </p:txBody>
+        </p:sp>
+        <p:sp>
+          <p:nvSpPr>
+            <p:cNvPr id="23" name="22 Rectángulo"/>
+            <p:cNvSpPr/>
+            <p:nvPr/>
+          </p:nvSpPr>
+          <p:spPr>
+            <a:xfrm>
+              <a:off x="2328306" y="4199063"/>
+              <a:ext cx="980204" cy="184666"/>
+            </a:xfrm>
+            <a:prstGeom prst="rect">
+              <a:avLst/>
+            </a:prstGeom>
+          </p:spPr>
+          <p:txBody>
+            <a:bodyPr wrap="none" lIns="0" tIns="0" rIns="0" bIns="0">
+              <a:spAutoFit/>
+            </a:bodyPr>
+            <a:lstStyle/>
+            <a:p>
+              <a:pPr algn="ctr"/>
+              <a:r>
+                <a:rPr lang="es-ES" sz="1200" dirty="0" err="1" smtClean="0"/>
+                <a:t>table_complete</a:t>
+              </a:r>
+              <a:endParaRPr lang="es-ES" sz="1200" dirty="0"/>
+            </a:p>
+          </p:txBody>
+        </p:sp>
+        <p:sp>
+          <p:nvSpPr>
+            <p:cNvPr id="24" name="23 Rectángulo"/>
+            <p:cNvSpPr/>
+            <p:nvPr/>
+          </p:nvSpPr>
+          <p:spPr>
+            <a:xfrm>
+              <a:off x="2184453" y="3735738"/>
+              <a:ext cx="1267911" cy="184666"/>
+            </a:xfrm>
+            <a:prstGeom prst="rect">
+              <a:avLst/>
+            </a:prstGeom>
+          </p:spPr>
+          <p:txBody>
+            <a:bodyPr wrap="none" lIns="0" tIns="0" rIns="0" bIns="0">
+              <a:spAutoFit/>
+            </a:bodyPr>
+            <a:lstStyle/>
+            <a:p>
+              <a:pPr algn="ctr"/>
+              <a:r>
+                <a:rPr lang="es-ES" sz="1200" dirty="0" err="1" smtClean="0"/>
+                <a:t>protein_information</a:t>
+              </a:r>
+              <a:endParaRPr lang="es-ES" sz="1200" dirty="0"/>
+            </a:p>
+          </p:txBody>
+        </p:sp>
+      </p:grpSp>
       <p:sp>
         <p:nvSpPr>
           <p:cNvPr id="25" name="Rectangle 3"/>
@@ -6128,15 +6143,7 @@
                     <a:prstClr val="black"/>
                   </a:solidFill>
                 </a:rPr>
-                <a:t>pd_maldi_match</a:t>
-              </a:r>
-              <a:r>
-                <a:rPr lang="es-ES" sz="1200" b="1" dirty="0" smtClean="0">
-                  <a:solidFill>
-                    <a:prstClr val="black"/>
-                  </a:solidFill>
-                </a:rPr>
-                <a:t>.py</a:t>
+                <a:t>pd_maldi_match.py</a:t>
               </a:r>
               <a:endParaRPr lang="en-US" sz="1100" b="1" dirty="0">
                 <a:solidFill>
@@ -6369,6 +6376,246 @@
           </a:fontRef>
         </p:style>
       </p:cxnSp>
+      <p:grpSp>
+        <p:nvGrpSpPr>
+          <p:cNvPr id="52" name="51 Grupo"/>
+          <p:cNvGrpSpPr/>
+          <p:nvPr/>
+        </p:nvGrpSpPr>
+        <p:grpSpPr>
+          <a:xfrm>
+            <a:off x="5311482" y="2513232"/>
+            <a:ext cx="2067024" cy="1032222"/>
+            <a:chOff x="1784896" y="3427530"/>
+            <a:chExt cx="2067024" cy="1032222"/>
+          </a:xfrm>
+        </p:grpSpPr>
+        <p:grpSp>
+          <p:nvGrpSpPr>
+            <p:cNvPr id="53" name="52 Grupo"/>
+            <p:cNvGrpSpPr/>
+            <p:nvPr/>
+          </p:nvGrpSpPr>
+          <p:grpSpPr>
+            <a:xfrm>
+              <a:off x="1784896" y="3427530"/>
+              <a:ext cx="2067024" cy="1032222"/>
+              <a:chOff x="2051174" y="1166809"/>
+              <a:chExt cx="1757678" cy="813615"/>
+            </a:xfrm>
+          </p:grpSpPr>
+          <p:sp>
+            <p:nvSpPr>
+              <p:cNvPr id="58" name="57 Rectángulo"/>
+              <p:cNvSpPr/>
+              <p:nvPr/>
+            </p:nvSpPr>
+            <p:spPr>
+              <a:xfrm>
+                <a:off x="2051174" y="1166809"/>
+                <a:ext cx="1756361" cy="198007"/>
+              </a:xfrm>
+              <a:prstGeom prst="rect">
+                <a:avLst/>
+              </a:prstGeom>
+              <a:noFill/>
+            </p:spPr>
+            <p:style>
+              <a:lnRef idx="2">
+                <a:schemeClr val="accent1">
+                  <a:shade val="50000"/>
+                </a:schemeClr>
+              </a:lnRef>
+              <a:fillRef idx="1">
+                <a:schemeClr val="accent1"/>
+              </a:fillRef>
+              <a:effectRef idx="0">
+                <a:schemeClr val="accent1"/>
+              </a:effectRef>
+              <a:fontRef idx="minor">
+                <a:schemeClr val="lt1"/>
+              </a:fontRef>
+            </p:style>
+            <p:txBody>
+              <a:bodyPr lIns="0" tIns="0" rIns="0" bIns="0" rtlCol="0" anchor="ctr"/>
+              <a:lstStyle/>
+              <a:p>
+                <a:pPr algn="ctr"/>
+                <a:endParaRPr lang="es-ES" sz="1200"/>
+              </a:p>
+            </p:txBody>
+          </p:sp>
+          <p:sp>
+            <p:nvSpPr>
+              <p:cNvPr id="59" name="58 Rectángulo"/>
+              <p:cNvSpPr/>
+              <p:nvPr/>
+            </p:nvSpPr>
+            <p:spPr>
+              <a:xfrm>
+                <a:off x="2052491" y="1362993"/>
+                <a:ext cx="1756361" cy="617431"/>
+              </a:xfrm>
+              <a:prstGeom prst="rect">
+                <a:avLst/>
+              </a:prstGeom>
+              <a:noFill/>
+            </p:spPr>
+            <p:style>
+              <a:lnRef idx="2">
+                <a:schemeClr val="accent1">
+                  <a:shade val="50000"/>
+                </a:schemeClr>
+              </a:lnRef>
+              <a:fillRef idx="1">
+                <a:schemeClr val="accent1"/>
+              </a:fillRef>
+              <a:effectRef idx="0">
+                <a:schemeClr val="accent1"/>
+              </a:effectRef>
+              <a:fontRef idx="minor">
+                <a:schemeClr val="lt1"/>
+              </a:fontRef>
+            </p:style>
+            <p:txBody>
+              <a:bodyPr lIns="0" tIns="0" rIns="0" bIns="0" rtlCol="0" anchor="ctr"/>
+              <a:lstStyle/>
+              <a:p>
+                <a:pPr algn="ctr"/>
+                <a:endParaRPr lang="es-ES" sz="1200"/>
+              </a:p>
+            </p:txBody>
+          </p:sp>
+        </p:grpSp>
+        <p:sp>
+          <p:nvSpPr>
+            <p:cNvPr id="54" name="53 Rectángulo"/>
+            <p:cNvSpPr/>
+            <p:nvPr/>
+          </p:nvSpPr>
+          <p:spPr>
+            <a:xfrm>
+              <a:off x="2109433" y="3460358"/>
+              <a:ext cx="1417952" cy="184666"/>
+            </a:xfrm>
+            <a:prstGeom prst="rect">
+              <a:avLst/>
+            </a:prstGeom>
+          </p:spPr>
+          <p:txBody>
+            <a:bodyPr wrap="none" lIns="0" tIns="0" rIns="0" bIns="0">
+              <a:spAutoFit/>
+            </a:bodyPr>
+            <a:lstStyle/>
+            <a:p>
+              <a:pPr lvl="0" algn="ctr"/>
+              <a:r>
+                <a:rPr lang="es-ES" sz="1200" b="1" dirty="0" smtClean="0">
+                  <a:solidFill>
+                    <a:prstClr val="black"/>
+                  </a:solidFill>
+                </a:rPr>
+                <a:t>pd_table_selection.py</a:t>
+              </a:r>
+              <a:endParaRPr lang="en-US" sz="1100" b="1" dirty="0">
+                <a:solidFill>
+                  <a:prstClr val="black"/>
+                </a:solidFill>
+              </a:endParaRPr>
+            </a:p>
+          </p:txBody>
+        </p:sp>
+        <p:sp>
+          <p:nvSpPr>
+            <p:cNvPr id="55" name="54 Rectángulo"/>
+            <p:cNvSpPr/>
+            <p:nvPr/>
+          </p:nvSpPr>
+          <p:spPr>
+            <a:xfrm>
+              <a:off x="1799189" y="3960629"/>
+              <a:ext cx="2038443" cy="184666"/>
+            </a:xfrm>
+            <a:prstGeom prst="rect">
+              <a:avLst/>
+            </a:prstGeom>
+          </p:spPr>
+          <p:txBody>
+            <a:bodyPr wrap="none" lIns="0" tIns="0" rIns="0" bIns="0">
+              <a:spAutoFit/>
+            </a:bodyPr>
+            <a:lstStyle/>
+            <a:p>
+              <a:pPr algn="ctr"/>
+              <a:r>
+                <a:rPr lang="es-ES" sz="1200" dirty="0" err="1" smtClean="0"/>
+                <a:t>most_abundant_entry_selection</a:t>
+              </a:r>
+              <a:endParaRPr lang="es-ES" sz="1200" dirty="0"/>
+            </a:p>
+          </p:txBody>
+        </p:sp>
+        <p:sp>
+          <p:nvSpPr>
+            <p:cNvPr id="56" name="55 Rectángulo"/>
+            <p:cNvSpPr/>
+            <p:nvPr/>
+          </p:nvSpPr>
+          <p:spPr>
+            <a:xfrm>
+              <a:off x="1918548" y="4199063"/>
+              <a:ext cx="1799723" cy="184666"/>
+            </a:xfrm>
+            <a:prstGeom prst="rect">
+              <a:avLst/>
+            </a:prstGeom>
+          </p:spPr>
+          <p:txBody>
+            <a:bodyPr wrap="none" lIns="0" tIns="0" rIns="0" bIns="0">
+              <a:spAutoFit/>
+            </a:bodyPr>
+            <a:lstStyle/>
+            <a:p>
+              <a:pPr algn="ctr"/>
+              <a:r>
+                <a:rPr lang="es-ES" sz="1200" dirty="0" err="1" smtClean="0"/>
+                <a:t>protein_name_simplification</a:t>
+              </a:r>
+              <a:endParaRPr lang="es-ES" sz="1200" dirty="0"/>
+            </a:p>
+          </p:txBody>
+        </p:sp>
+        <p:sp>
+          <p:nvSpPr>
+            <p:cNvPr id="57" name="56 Rectángulo"/>
+            <p:cNvSpPr/>
+            <p:nvPr/>
+          </p:nvSpPr>
+          <p:spPr>
+            <a:xfrm>
+              <a:off x="2210167" y="3735738"/>
+              <a:ext cx="1216487" cy="184666"/>
+            </a:xfrm>
+            <a:prstGeom prst="rect">
+              <a:avLst/>
+            </a:prstGeom>
+          </p:spPr>
+          <p:txBody>
+            <a:bodyPr wrap="none" lIns="0" tIns="0" rIns="0" bIns="0">
+              <a:spAutoFit/>
+            </a:bodyPr>
+            <a:lstStyle/>
+            <a:p>
+              <a:pPr algn="ctr"/>
+              <a:r>
+                <a:rPr lang="es-ES" sz="1200" dirty="0" err="1" smtClean="0"/>
+                <a:t>organism_selection</a:t>
+              </a:r>
+              <a:endParaRPr lang="es-ES" sz="1200" dirty="0"/>
+            </a:p>
+          </p:txBody>
+        </p:sp>
+      </p:grpSp>
     </p:spTree>
     <p:extLst>
       <p:ext uri="{BB962C8B-B14F-4D97-AF65-F5344CB8AC3E}">

</xml_diff>

<commit_message>
One! more module in scheme
</commit_message>
<xml_diff>
--- a/docs/Summary.pptx
+++ b/docs/Summary.pptx
@@ -289,7 +289,7 @@
           <a:p>
             <a:fld id="{7A847CFC-816F-41D0-AAC0-9BF4FEBC753E}" type="datetimeFigureOut">
               <a:rPr lang="es-ES" smtClean="0"/>
-              <a:t>02/03/2022</a:t>
+              <a:t>04/03/2022</a:t>
             </a:fld>
             <a:endParaRPr lang="es-ES"/>
           </a:p>
@@ -454,7 +454,7 @@
           <a:p>
             <a:fld id="{7A847CFC-816F-41D0-AAC0-9BF4FEBC753E}" type="datetimeFigureOut">
               <a:rPr lang="es-ES" smtClean="0"/>
-              <a:t>02/03/2022</a:t>
+              <a:t>04/03/2022</a:t>
             </a:fld>
             <a:endParaRPr lang="es-ES"/>
           </a:p>
@@ -629,7 +629,7 @@
           <a:p>
             <a:fld id="{7A847CFC-816F-41D0-AAC0-9BF4FEBC753E}" type="datetimeFigureOut">
               <a:rPr lang="es-ES" smtClean="0"/>
-              <a:t>02/03/2022</a:t>
+              <a:t>04/03/2022</a:t>
             </a:fld>
             <a:endParaRPr lang="es-ES"/>
           </a:p>
@@ -794,7 +794,7 @@
           <a:p>
             <a:fld id="{7A847CFC-816F-41D0-AAC0-9BF4FEBC753E}" type="datetimeFigureOut">
               <a:rPr lang="es-ES" smtClean="0"/>
-              <a:t>02/03/2022</a:t>
+              <a:t>04/03/2022</a:t>
             </a:fld>
             <a:endParaRPr lang="es-ES"/>
           </a:p>
@@ -1035,7 +1035,7 @@
           <a:p>
             <a:fld id="{7A847CFC-816F-41D0-AAC0-9BF4FEBC753E}" type="datetimeFigureOut">
               <a:rPr lang="es-ES" smtClean="0"/>
-              <a:t>02/03/2022</a:t>
+              <a:t>04/03/2022</a:t>
             </a:fld>
             <a:endParaRPr lang="es-ES"/>
           </a:p>
@@ -1318,7 +1318,7 @@
           <a:p>
             <a:fld id="{7A847CFC-816F-41D0-AAC0-9BF4FEBC753E}" type="datetimeFigureOut">
               <a:rPr lang="es-ES" smtClean="0"/>
-              <a:t>02/03/2022</a:t>
+              <a:t>04/03/2022</a:t>
             </a:fld>
             <a:endParaRPr lang="es-ES"/>
           </a:p>
@@ -1735,7 +1735,7 @@
           <a:p>
             <a:fld id="{7A847CFC-816F-41D0-AAC0-9BF4FEBC753E}" type="datetimeFigureOut">
               <a:rPr lang="es-ES" smtClean="0"/>
-              <a:t>02/03/2022</a:t>
+              <a:t>04/03/2022</a:t>
             </a:fld>
             <a:endParaRPr lang="es-ES"/>
           </a:p>
@@ -1848,7 +1848,7 @@
           <a:p>
             <a:fld id="{7A847CFC-816F-41D0-AAC0-9BF4FEBC753E}" type="datetimeFigureOut">
               <a:rPr lang="es-ES" smtClean="0"/>
-              <a:t>02/03/2022</a:t>
+              <a:t>04/03/2022</a:t>
             </a:fld>
             <a:endParaRPr lang="es-ES"/>
           </a:p>
@@ -1938,7 +1938,7 @@
           <a:p>
             <a:fld id="{7A847CFC-816F-41D0-AAC0-9BF4FEBC753E}" type="datetimeFigureOut">
               <a:rPr lang="es-ES" smtClean="0"/>
-              <a:t>02/03/2022</a:t>
+              <a:t>04/03/2022</a:t>
             </a:fld>
             <a:endParaRPr lang="es-ES"/>
           </a:p>
@@ -2210,7 +2210,7 @@
           <a:p>
             <a:fld id="{7A847CFC-816F-41D0-AAC0-9BF4FEBC753E}" type="datetimeFigureOut">
               <a:rPr lang="es-ES" smtClean="0"/>
-              <a:t>02/03/2022</a:t>
+              <a:t>04/03/2022</a:t>
             </a:fld>
             <a:endParaRPr lang="es-ES"/>
           </a:p>
@@ -2458,7 +2458,7 @@
           <a:p>
             <a:fld id="{7A847CFC-816F-41D0-AAC0-9BF4FEBC753E}" type="datetimeFigureOut">
               <a:rPr lang="es-ES" smtClean="0"/>
-              <a:t>02/03/2022</a:t>
+              <a:t>04/03/2022</a:t>
             </a:fld>
             <a:endParaRPr lang="es-ES"/>
           </a:p>
@@ -2666,7 +2666,7 @@
           <a:p>
             <a:fld id="{7A847CFC-816F-41D0-AAC0-9BF4FEBC753E}" type="datetimeFigureOut">
               <a:rPr lang="es-ES" smtClean="0"/>
-              <a:t>02/03/2022</a:t>
+              <a:t>04/03/2022</a:t>
             </a:fld>
             <a:endParaRPr lang="es-ES"/>
           </a:p>
@@ -6616,6 +6616,295 @@
           </p:txBody>
         </p:sp>
       </p:grpSp>
+      <p:grpSp>
+        <p:nvGrpSpPr>
+          <p:cNvPr id="61" name="60 Grupo"/>
+          <p:cNvGrpSpPr/>
+          <p:nvPr/>
+        </p:nvGrpSpPr>
+        <p:grpSpPr>
+          <a:xfrm>
+            <a:off x="5882621" y="140308"/>
+            <a:ext cx="2007641" cy="1459517"/>
+            <a:chOff x="2263206" y="1166811"/>
+            <a:chExt cx="1545646" cy="1150416"/>
+          </a:xfrm>
+        </p:grpSpPr>
+        <p:sp>
+          <p:nvSpPr>
+            <p:cNvPr id="68" name="67 Rectángulo"/>
+            <p:cNvSpPr/>
+            <p:nvPr/>
+          </p:nvSpPr>
+          <p:spPr>
+            <a:xfrm>
+              <a:off x="2263206" y="1166811"/>
+              <a:ext cx="1544330" cy="198006"/>
+            </a:xfrm>
+            <a:prstGeom prst="rect">
+              <a:avLst/>
+            </a:prstGeom>
+            <a:noFill/>
+          </p:spPr>
+          <p:style>
+            <a:lnRef idx="2">
+              <a:schemeClr val="accent1">
+                <a:shade val="50000"/>
+              </a:schemeClr>
+            </a:lnRef>
+            <a:fillRef idx="1">
+              <a:schemeClr val="accent1"/>
+            </a:fillRef>
+            <a:effectRef idx="0">
+              <a:schemeClr val="accent1"/>
+            </a:effectRef>
+            <a:fontRef idx="minor">
+              <a:schemeClr val="lt1"/>
+            </a:fontRef>
+          </p:style>
+          <p:txBody>
+            <a:bodyPr lIns="0" tIns="0" rIns="0" bIns="0" rtlCol="0" anchor="ctr"/>
+            <a:lstStyle/>
+            <a:p>
+              <a:pPr algn="ctr"/>
+              <a:endParaRPr lang="es-ES" sz="1200"/>
+            </a:p>
+          </p:txBody>
+        </p:sp>
+        <p:sp>
+          <p:nvSpPr>
+            <p:cNvPr id="69" name="68 Rectángulo"/>
+            <p:cNvSpPr/>
+            <p:nvPr/>
+          </p:nvSpPr>
+          <p:spPr>
+            <a:xfrm>
+              <a:off x="2263206" y="1362992"/>
+              <a:ext cx="1545646" cy="954235"/>
+            </a:xfrm>
+            <a:prstGeom prst="rect">
+              <a:avLst/>
+            </a:prstGeom>
+            <a:noFill/>
+          </p:spPr>
+          <p:style>
+            <a:lnRef idx="2">
+              <a:schemeClr val="accent1">
+                <a:shade val="50000"/>
+              </a:schemeClr>
+            </a:lnRef>
+            <a:fillRef idx="1">
+              <a:schemeClr val="accent1"/>
+            </a:fillRef>
+            <a:effectRef idx="0">
+              <a:schemeClr val="accent1"/>
+            </a:effectRef>
+            <a:fontRef idx="minor">
+              <a:schemeClr val="lt1"/>
+            </a:fontRef>
+          </p:style>
+          <p:txBody>
+            <a:bodyPr lIns="0" tIns="0" rIns="0" bIns="0" rtlCol="0" anchor="ctr"/>
+            <a:lstStyle/>
+            <a:p>
+              <a:pPr algn="ctr"/>
+              <a:endParaRPr lang="es-ES" sz="1200"/>
+            </a:p>
+          </p:txBody>
+        </p:sp>
+      </p:grpSp>
+      <p:sp>
+        <p:nvSpPr>
+          <p:cNvPr id="62" name="61 Rectángulo"/>
+          <p:cNvSpPr/>
+          <p:nvPr/>
+        </p:nvSpPr>
+        <p:spPr>
+          <a:xfrm>
+            <a:off x="6226915" y="143154"/>
+            <a:ext cx="1173655" cy="184666"/>
+          </a:xfrm>
+          <a:prstGeom prst="rect">
+            <a:avLst/>
+          </a:prstGeom>
+        </p:spPr>
+        <p:txBody>
+          <a:bodyPr wrap="none" lIns="0" tIns="0" rIns="0" bIns="0">
+            <a:spAutoFit/>
+          </a:bodyPr>
+          <a:lstStyle/>
+          <a:p>
+            <a:pPr lvl="0" algn="ctr"/>
+            <a:r>
+              <a:rPr lang="es-ES" sz="1200" b="1" dirty="0" smtClean="0">
+                <a:solidFill>
+                  <a:prstClr val="black"/>
+                </a:solidFill>
+              </a:rPr>
+              <a:t>protein_signals.py</a:t>
+            </a:r>
+            <a:endParaRPr lang="en-US" sz="1100" b="1" dirty="0">
+              <a:solidFill>
+                <a:prstClr val="black"/>
+              </a:solidFill>
+            </a:endParaRPr>
+          </a:p>
+        </p:txBody>
+      </p:sp>
+      <p:sp>
+        <p:nvSpPr>
+          <p:cNvPr id="63" name="62 Rectángulo"/>
+          <p:cNvSpPr/>
+          <p:nvPr/>
+        </p:nvSpPr>
+        <p:spPr>
+          <a:xfrm>
+            <a:off x="6605556" y="639456"/>
+            <a:ext cx="546625" cy="169277"/>
+          </a:xfrm>
+          <a:prstGeom prst="rect">
+            <a:avLst/>
+          </a:prstGeom>
+        </p:spPr>
+        <p:txBody>
+          <a:bodyPr wrap="none" lIns="0" tIns="0" rIns="0" bIns="0">
+            <a:spAutoFit/>
+          </a:bodyPr>
+          <a:lstStyle/>
+          <a:p>
+            <a:pPr algn="ctr"/>
+            <a:r>
+              <a:rPr lang="es-ES" sz="1100" dirty="0" err="1" smtClean="0"/>
+              <a:t>fill_table</a:t>
+            </a:r>
+            <a:r>
+              <a:rPr lang="es-ES" sz="1100" dirty="0" err="1" smtClean="0"/>
+              <a:t>t</a:t>
+            </a:r>
+            <a:endParaRPr lang="es-ES" sz="1100" dirty="0"/>
+          </a:p>
+        </p:txBody>
+      </p:sp>
+      <p:sp>
+        <p:nvSpPr>
+          <p:cNvPr id="64" name="63 Rectángulo"/>
+          <p:cNvSpPr/>
+          <p:nvPr/>
+        </p:nvSpPr>
+        <p:spPr>
+          <a:xfrm>
+            <a:off x="6444871" y="859979"/>
+            <a:ext cx="867995" cy="184666"/>
+          </a:xfrm>
+          <a:prstGeom prst="rect">
+            <a:avLst/>
+          </a:prstGeom>
+        </p:spPr>
+        <p:txBody>
+          <a:bodyPr wrap="none" lIns="0" tIns="0" rIns="0" bIns="0">
+            <a:spAutoFit/>
+          </a:bodyPr>
+          <a:lstStyle/>
+          <a:p>
+            <a:pPr algn="ctr"/>
+            <a:r>
+              <a:rPr lang="es-ES" sz="1200" dirty="0" err="1" smtClean="0"/>
+              <a:t>table_request</a:t>
+            </a:r>
+            <a:endParaRPr lang="es-ES" sz="1200" dirty="0"/>
+          </a:p>
+        </p:txBody>
+      </p:sp>
+      <p:sp>
+        <p:nvSpPr>
+          <p:cNvPr id="65" name="64 Rectángulo"/>
+          <p:cNvSpPr/>
+          <p:nvPr/>
+        </p:nvSpPr>
+        <p:spPr>
+          <a:xfrm>
+            <a:off x="6241194" y="403544"/>
+            <a:ext cx="1275349" cy="184666"/>
+          </a:xfrm>
+          <a:prstGeom prst="rect">
+            <a:avLst/>
+          </a:prstGeom>
+        </p:spPr>
+        <p:txBody>
+          <a:bodyPr wrap="none" lIns="0" tIns="0" rIns="0" bIns="0">
+            <a:spAutoFit/>
+          </a:bodyPr>
+          <a:lstStyle/>
+          <a:p>
+            <a:pPr algn="ctr"/>
+            <a:r>
+              <a:rPr lang="es-ES" sz="1200" dirty="0" err="1" smtClean="0"/>
+              <a:t>table_comprobation</a:t>
+            </a:r>
+            <a:endParaRPr lang="es-ES" sz="1200" dirty="0"/>
+          </a:p>
+        </p:txBody>
+      </p:sp>
+      <p:sp>
+        <p:nvSpPr>
+          <p:cNvPr id="66" name="65 Rectángulo"/>
+          <p:cNvSpPr/>
+          <p:nvPr/>
+        </p:nvSpPr>
+        <p:spPr>
+          <a:xfrm>
+            <a:off x="6503894" y="1095891"/>
+            <a:ext cx="749949" cy="184666"/>
+          </a:xfrm>
+          <a:prstGeom prst="rect">
+            <a:avLst/>
+          </a:prstGeom>
+        </p:spPr>
+        <p:txBody>
+          <a:bodyPr wrap="none" lIns="0" tIns="0" rIns="0" bIns="0">
+            <a:spAutoFit/>
+          </a:bodyPr>
+          <a:lstStyle/>
+          <a:p>
+            <a:pPr algn="ctr"/>
+            <a:r>
+              <a:rPr lang="es-ES" sz="1200" dirty="0" err="1" smtClean="0"/>
+              <a:t>table_union</a:t>
+            </a:r>
+            <a:endParaRPr lang="es-ES" sz="1200" dirty="0"/>
+          </a:p>
+        </p:txBody>
+      </p:sp>
+      <p:sp>
+        <p:nvSpPr>
+          <p:cNvPr id="67" name="66 Rectángulo"/>
+          <p:cNvSpPr/>
+          <p:nvPr/>
+        </p:nvSpPr>
+        <p:spPr>
+          <a:xfrm>
+            <a:off x="6247189" y="1331803"/>
+            <a:ext cx="1263359" cy="184666"/>
+          </a:xfrm>
+          <a:prstGeom prst="rect">
+            <a:avLst/>
+          </a:prstGeom>
+        </p:spPr>
+        <p:txBody>
+          <a:bodyPr wrap="none" lIns="0" tIns="0" rIns="0" bIns="0">
+            <a:spAutoFit/>
+          </a:bodyPr>
+          <a:lstStyle/>
+          <a:p>
+            <a:pPr algn="ctr"/>
+            <a:r>
+              <a:rPr lang="es-ES" sz="1200" dirty="0" err="1" smtClean="0"/>
+              <a:t>relat_intensity_calc</a:t>
+            </a:r>
+            <a:endParaRPr lang="es-ES" sz="1200" dirty="0"/>
+          </a:p>
+        </p:txBody>
+      </p:sp>
     </p:spTree>
     <p:extLst>
       <p:ext uri="{BB962C8B-B14F-4D97-AF65-F5344CB8AC3E}">

</xml_diff>